<commit_message>
2018 SER Workshop Files
</commit_message>
<xml_diff>
--- a/RWorkshopBonus-AbstractOrientation.pptx
+++ b/RWorkshopBonus-AbstractOrientation.pptx
@@ -299,7 +299,7 @@
           <a:p>
             <a:fld id="{17C56B74-080E-4B5F-9FC6-14C2AADA9F3A}" type="datetimeFigureOut">
               <a:rPr lang="en-US" smtClean="0"/>
-              <a:t>6/19/2017</a:t>
+              <a:t>6/15/18</a:t>
             </a:fld>
             <a:endParaRPr lang="en-US"/>
           </a:p>
@@ -469,7 +469,7 @@
           <a:p>
             <a:fld id="{17C56B74-080E-4B5F-9FC6-14C2AADA9F3A}" type="datetimeFigureOut">
               <a:rPr lang="en-US" smtClean="0"/>
-              <a:t>6/19/2017</a:t>
+              <a:t>6/15/18</a:t>
             </a:fld>
             <a:endParaRPr lang="en-US"/>
           </a:p>
@@ -649,7 +649,7 @@
           <a:p>
             <a:fld id="{17C56B74-080E-4B5F-9FC6-14C2AADA9F3A}" type="datetimeFigureOut">
               <a:rPr lang="en-US" smtClean="0"/>
-              <a:t>6/19/2017</a:t>
+              <a:t>6/15/18</a:t>
             </a:fld>
             <a:endParaRPr lang="en-US"/>
           </a:p>
@@ -819,7 +819,7 @@
           <a:p>
             <a:fld id="{17C56B74-080E-4B5F-9FC6-14C2AADA9F3A}" type="datetimeFigureOut">
               <a:rPr lang="en-US" smtClean="0"/>
-              <a:t>6/19/2017</a:t>
+              <a:t>6/15/18</a:t>
             </a:fld>
             <a:endParaRPr lang="en-US"/>
           </a:p>
@@ -1065,7 +1065,7 @@
           <a:p>
             <a:fld id="{17C56B74-080E-4B5F-9FC6-14C2AADA9F3A}" type="datetimeFigureOut">
               <a:rPr lang="en-US" smtClean="0"/>
-              <a:t>6/19/2017</a:t>
+              <a:t>6/15/18</a:t>
             </a:fld>
             <a:endParaRPr lang="en-US"/>
           </a:p>
@@ -1353,7 +1353,7 @@
           <a:p>
             <a:fld id="{17C56B74-080E-4B5F-9FC6-14C2AADA9F3A}" type="datetimeFigureOut">
               <a:rPr lang="en-US" smtClean="0"/>
-              <a:t>6/19/2017</a:t>
+              <a:t>6/15/18</a:t>
             </a:fld>
             <a:endParaRPr lang="en-US"/>
           </a:p>
@@ -1775,7 +1775,7 @@
           <a:p>
             <a:fld id="{17C56B74-080E-4B5F-9FC6-14C2AADA9F3A}" type="datetimeFigureOut">
               <a:rPr lang="en-US" smtClean="0"/>
-              <a:t>6/19/2017</a:t>
+              <a:t>6/15/18</a:t>
             </a:fld>
             <a:endParaRPr lang="en-US"/>
           </a:p>
@@ -1893,7 +1893,7 @@
           <a:p>
             <a:fld id="{17C56B74-080E-4B5F-9FC6-14C2AADA9F3A}" type="datetimeFigureOut">
               <a:rPr lang="en-US" smtClean="0"/>
-              <a:t>6/19/2017</a:t>
+              <a:t>6/15/18</a:t>
             </a:fld>
             <a:endParaRPr lang="en-US"/>
           </a:p>
@@ -1988,7 +1988,7 @@
           <a:p>
             <a:fld id="{17C56B74-080E-4B5F-9FC6-14C2AADA9F3A}" type="datetimeFigureOut">
               <a:rPr lang="en-US" smtClean="0"/>
-              <a:t>6/19/2017</a:t>
+              <a:t>6/15/18</a:t>
             </a:fld>
             <a:endParaRPr lang="en-US"/>
           </a:p>
@@ -2265,7 +2265,7 @@
           <a:p>
             <a:fld id="{17C56B74-080E-4B5F-9FC6-14C2AADA9F3A}" type="datetimeFigureOut">
               <a:rPr lang="en-US" smtClean="0"/>
-              <a:t>6/19/2017</a:t>
+              <a:t>6/15/18</a:t>
             </a:fld>
             <a:endParaRPr lang="en-US"/>
           </a:p>
@@ -2518,7 +2518,7 @@
           <a:p>
             <a:fld id="{17C56B74-080E-4B5F-9FC6-14C2AADA9F3A}" type="datetimeFigureOut">
               <a:rPr lang="en-US" smtClean="0"/>
-              <a:t>6/19/2017</a:t>
+              <a:t>6/15/18</a:t>
             </a:fld>
             <a:endParaRPr lang="en-US"/>
           </a:p>
@@ -2731,7 +2731,7 @@
           <a:p>
             <a:fld id="{17C56B74-080E-4B5F-9FC6-14C2AADA9F3A}" type="datetimeFigureOut">
               <a:rPr lang="en-US" smtClean="0"/>
-              <a:t>6/19/2017</a:t>
+              <a:t>6/15/18</a:t>
             </a:fld>
             <a:endParaRPr lang="en-US"/>
           </a:p>
@@ -3159,8 +3159,12 @@
           </a:p>
           <a:p>
             <a:r>
-              <a:rPr lang="en-US" dirty="0" smtClean="0"/>
-              <a:t>SER 2017</a:t>
+              <a:rPr lang="en-US" smtClean="0"/>
+              <a:t>SER </a:t>
+            </a:r>
+            <a:r>
+              <a:rPr lang="en-US" smtClean="0"/>
+              <a:t>2018</a:t>
             </a:r>
             <a:endParaRPr lang="en-US" dirty="0" smtClean="0"/>
           </a:p>
@@ -3391,14 +3395,14 @@
           </a:ln>
           <a:effectLst/>
           <a:extLst>
-            <a:ext uri="{909E8E84-426E-40DD-AFC4-6F175D3DCCD1}">
+            <a:ext uri="{909E8E84-426E-40dd-AFC4-6F175D3DCCD1}">
               <a14:hiddenFill xmlns:a14="http://schemas.microsoft.com/office/drawing/2010/main">
                 <a:solidFill>
                   <a:schemeClr val="accent1"/>
                 </a:solidFill>
               </a14:hiddenFill>
             </a:ext>
-            <a:ext uri="{91240B29-F687-4F45-9708-019B960494DF}">
+            <a:ext uri="{91240B29-F687-4f45-9708-019B960494DF}">
               <a14:hiddenLine xmlns:a14="http://schemas.microsoft.com/office/drawing/2010/main" w="9525">
                 <a:solidFill>
                   <a:schemeClr val="tx1"/>
@@ -3408,7 +3412,7 @@
                 <a:tailEnd/>
               </a14:hiddenLine>
             </a:ext>
-            <a:ext uri="{AF507438-7753-43E0-B8FC-AC1667EBCBE1}">
+            <a:ext uri="{AF507438-7753-43e0-B8FC-AC1667EBCBE1}">
               <a14:hiddenEffects xmlns:a14="http://schemas.microsoft.com/office/drawing/2010/main">
                 <a:effectLst>
                   <a:outerShdw dist="35921" dir="2700000" algn="ctr" rotWithShape="0">
@@ -3433,7 +3437,7 @@
   <p:timing>
     <p:tnLst>
       <p:par>
-        <p:cTn id="1" dur="indefinite" restart="never" nodeType="tmRoot"/>
+        <p:cTn xmlns:p14="http://schemas.microsoft.com/office/powerpoint/2010/main" id="1" dur="indefinite" restart="never" nodeType="tmRoot"/>
       </p:par>
     </p:tnLst>
   </p:timing>
@@ -3644,14 +3648,14 @@
           </a:ln>
           <a:effectLst/>
           <a:extLst>
-            <a:ext uri="{909E8E84-426E-40DD-AFC4-6F175D3DCCD1}">
+            <a:ext uri="{909E8E84-426E-40dd-AFC4-6F175D3DCCD1}">
               <a14:hiddenFill xmlns:a14="http://schemas.microsoft.com/office/drawing/2010/main">
                 <a:solidFill>
                   <a:schemeClr val="accent1"/>
                 </a:solidFill>
               </a14:hiddenFill>
             </a:ext>
-            <a:ext uri="{91240B29-F687-4F45-9708-019B960494DF}">
+            <a:ext uri="{91240B29-F687-4f45-9708-019B960494DF}">
               <a14:hiddenLine xmlns:a14="http://schemas.microsoft.com/office/drawing/2010/main" w="9525">
                 <a:solidFill>
                   <a:schemeClr val="tx1"/>
@@ -3661,7 +3665,7 @@
                 <a:tailEnd/>
               </a14:hiddenLine>
             </a:ext>
-            <a:ext uri="{AF507438-7753-43E0-B8FC-AC1667EBCBE1}">
+            <a:ext uri="{AF507438-7753-43e0-B8FC-AC1667EBCBE1}">
               <a14:hiddenEffects xmlns:a14="http://schemas.microsoft.com/office/drawing/2010/main">
                 <a:effectLst>
                   <a:outerShdw dist="35921" dir="2700000" algn="ctr" rotWithShape="0">
@@ -3686,7 +3690,7 @@
   <p:timing>
     <p:tnLst>
       <p:par>
-        <p:cTn id="1" dur="indefinite" restart="never" nodeType="tmRoot"/>
+        <p:cTn xmlns:p14="http://schemas.microsoft.com/office/powerpoint/2010/main" id="1" dur="indefinite" restart="never" nodeType="tmRoot"/>
       </p:par>
     </p:tnLst>
   </p:timing>
@@ -3786,14 +3790,14 @@
             <a:noFill/>
           </a:ln>
           <a:extLst>
-            <a:ext uri="{909E8E84-426E-40DD-AFC4-6F175D3DCCD1}">
+            <a:ext uri="{909E8E84-426E-40dd-AFC4-6F175D3DCCD1}">
               <a14:hiddenFill xmlns:a14="http://schemas.microsoft.com/office/drawing/2010/main">
                 <a:solidFill>
                   <a:schemeClr val="accent1"/>
                 </a:solidFill>
               </a14:hiddenFill>
             </a:ext>
-            <a:ext uri="{91240B29-F687-4F45-9708-019B960494DF}">
+            <a:ext uri="{91240B29-F687-4f45-9708-019B960494DF}">
               <a14:hiddenLine xmlns:a14="http://schemas.microsoft.com/office/drawing/2010/main" w="9525">
                 <a:solidFill>
                   <a:schemeClr val="tx1"/>
@@ -3837,7 +3841,7 @@
           </a:prstGeom>
           <a:noFill/>
           <a:extLst>
-            <a:ext uri="{909E8E84-426E-40DD-AFC4-6F175D3DCCD1}">
+            <a:ext uri="{909E8E84-426E-40dd-AFC4-6F175D3DCCD1}">
               <a14:hiddenFill xmlns:a14="http://schemas.microsoft.com/office/drawing/2010/main">
                 <a:solidFill>
                   <a:srgbClr val="FFFFFF"/>
@@ -3860,7 +3864,7 @@
   <p:timing>
     <p:tnLst>
       <p:par>
-        <p:cTn id="1" dur="indefinite" restart="never" nodeType="tmRoot">
+        <p:cTn xmlns:p14="http://schemas.microsoft.com/office/powerpoint/2010/main" id="1" dur="indefinite" restart="never" nodeType="tmRoot">
           <p:childTnLst>
             <p:seq concurrent="1" nextAc="seek">
               <p:cTn id="2" dur="indefinite" nodeType="mainSeq">
@@ -4009,14 +4013,14 @@
             <a:noFill/>
           </a:ln>
           <a:extLst>
-            <a:ext uri="{909E8E84-426E-40DD-AFC4-6F175D3DCCD1}">
+            <a:ext uri="{909E8E84-426E-40dd-AFC4-6F175D3DCCD1}">
               <a14:hiddenFill xmlns:a14="http://schemas.microsoft.com/office/drawing/2010/main">
                 <a:solidFill>
                   <a:schemeClr val="accent1"/>
                 </a:solidFill>
               </a14:hiddenFill>
             </a:ext>
-            <a:ext uri="{91240B29-F687-4F45-9708-019B960494DF}">
+            <a:ext uri="{91240B29-F687-4f45-9708-019B960494DF}">
               <a14:hiddenLine xmlns:a14="http://schemas.microsoft.com/office/drawing/2010/main" w="9525">
                 <a:solidFill>
                   <a:schemeClr val="tx1"/>
@@ -4042,7 +4046,7 @@
   <p:timing>
     <p:tnLst>
       <p:par>
-        <p:cTn id="1" dur="indefinite" restart="never" nodeType="tmRoot">
+        <p:cTn xmlns:p14="http://schemas.microsoft.com/office/powerpoint/2010/main" id="1" dur="indefinite" restart="never" nodeType="tmRoot">
           <p:childTnLst>
             <p:seq concurrent="1" nextAc="seek">
               <p:cTn id="2" dur="indefinite" nodeType="mainSeq">
@@ -4352,14 +4356,14 @@
           </a:ln>
           <a:effectLst/>
           <a:extLst>
-            <a:ext uri="{909E8E84-426E-40DD-AFC4-6F175D3DCCD1}">
+            <a:ext uri="{909E8E84-426E-40dd-AFC4-6F175D3DCCD1}">
               <a14:hiddenFill xmlns:a14="http://schemas.microsoft.com/office/drawing/2010/main">
                 <a:solidFill>
                   <a:schemeClr val="accent1"/>
                 </a:solidFill>
               </a14:hiddenFill>
             </a:ext>
-            <a:ext uri="{91240B29-F687-4F45-9708-019B960494DF}">
+            <a:ext uri="{91240B29-F687-4f45-9708-019B960494DF}">
               <a14:hiddenLine xmlns:a14="http://schemas.microsoft.com/office/drawing/2010/main" w="9525">
                 <a:solidFill>
                   <a:schemeClr val="tx1"/>
@@ -4369,7 +4373,7 @@
                 <a:tailEnd/>
               </a14:hiddenLine>
             </a:ext>
-            <a:ext uri="{AF507438-7753-43E0-B8FC-AC1667EBCBE1}">
+            <a:ext uri="{AF507438-7753-43e0-B8FC-AC1667EBCBE1}">
               <a14:hiddenEffects xmlns:a14="http://schemas.microsoft.com/office/drawing/2010/main">
                 <a:effectLst>
                   <a:outerShdw dist="35921" dir="2700000" algn="ctr" rotWithShape="0">
@@ -4394,7 +4398,7 @@
   <p:timing>
     <p:tnLst>
       <p:par>
-        <p:cTn id="1" dur="indefinite" restart="never" nodeType="tmRoot"/>
+        <p:cTn xmlns:p14="http://schemas.microsoft.com/office/powerpoint/2010/main" id="1" dur="indefinite" restart="never" nodeType="tmRoot"/>
       </p:par>
     </p:tnLst>
   </p:timing>
@@ -4643,14 +4647,14 @@
           </a:ln>
           <a:effectLst/>
           <a:extLst>
-            <a:ext uri="{909E8E84-426E-40DD-AFC4-6F175D3DCCD1}">
+            <a:ext uri="{909E8E84-426E-40dd-AFC4-6F175D3DCCD1}">
               <a14:hiddenFill xmlns:a14="http://schemas.microsoft.com/office/drawing/2010/main">
                 <a:solidFill>
                   <a:schemeClr val="accent1"/>
                 </a:solidFill>
               </a14:hiddenFill>
             </a:ext>
-            <a:ext uri="{91240B29-F687-4F45-9708-019B960494DF}">
+            <a:ext uri="{91240B29-F687-4f45-9708-019B960494DF}">
               <a14:hiddenLine xmlns:a14="http://schemas.microsoft.com/office/drawing/2010/main" w="9525">
                 <a:solidFill>
                   <a:schemeClr val="tx1"/>
@@ -4660,7 +4664,7 @@
                 <a:tailEnd/>
               </a14:hiddenLine>
             </a:ext>
-            <a:ext uri="{AF507438-7753-43E0-B8FC-AC1667EBCBE1}">
+            <a:ext uri="{AF507438-7753-43e0-B8FC-AC1667EBCBE1}">
               <a14:hiddenEffects xmlns:a14="http://schemas.microsoft.com/office/drawing/2010/main">
                 <a:effectLst>
                   <a:outerShdw dist="35921" dir="2700000" algn="ctr" rotWithShape="0">
@@ -4685,7 +4689,7 @@
   <p:timing>
     <p:tnLst>
       <p:par>
-        <p:cTn id="1" dur="indefinite" restart="never" nodeType="tmRoot"/>
+        <p:cTn xmlns:p14="http://schemas.microsoft.com/office/powerpoint/2010/main" id="1" dur="indefinite" restart="never" nodeType="tmRoot"/>
       </p:par>
     </p:tnLst>
   </p:timing>
@@ -4888,14 +4892,14 @@
           </a:ln>
           <a:effectLst/>
           <a:extLst>
-            <a:ext uri="{909E8E84-426E-40DD-AFC4-6F175D3DCCD1}">
+            <a:ext uri="{909E8E84-426E-40dd-AFC4-6F175D3DCCD1}">
               <a14:hiddenFill xmlns:a14="http://schemas.microsoft.com/office/drawing/2010/main">
                 <a:solidFill>
                   <a:schemeClr val="accent1"/>
                 </a:solidFill>
               </a14:hiddenFill>
             </a:ext>
-            <a:ext uri="{91240B29-F687-4F45-9708-019B960494DF}">
+            <a:ext uri="{91240B29-F687-4f45-9708-019B960494DF}">
               <a14:hiddenLine xmlns:a14="http://schemas.microsoft.com/office/drawing/2010/main" w="9525">
                 <a:solidFill>
                   <a:schemeClr val="tx1"/>
@@ -4905,7 +4909,7 @@
                 <a:tailEnd/>
               </a14:hiddenLine>
             </a:ext>
-            <a:ext uri="{AF507438-7753-43E0-B8FC-AC1667EBCBE1}">
+            <a:ext uri="{AF507438-7753-43e0-B8FC-AC1667EBCBE1}">
               <a14:hiddenEffects xmlns:a14="http://schemas.microsoft.com/office/drawing/2010/main">
                 <a:effectLst>
                   <a:outerShdw dist="35921" dir="2700000" algn="ctr" rotWithShape="0">
@@ -4930,7 +4934,7 @@
   <p:timing>
     <p:tnLst>
       <p:par>
-        <p:cTn id="1" dur="indefinite" restart="never" nodeType="tmRoot"/>
+        <p:cTn xmlns:p14="http://schemas.microsoft.com/office/powerpoint/2010/main" id="1" dur="indefinite" restart="never" nodeType="tmRoot"/>
       </p:par>
     </p:tnLst>
   </p:timing>
@@ -5180,14 +5184,14 @@
           </a:ln>
           <a:effectLst/>
           <a:extLst>
-            <a:ext uri="{909E8E84-426E-40DD-AFC4-6F175D3DCCD1}">
+            <a:ext uri="{909E8E84-426E-40dd-AFC4-6F175D3DCCD1}">
               <a14:hiddenFill xmlns:a14="http://schemas.microsoft.com/office/drawing/2010/main">
                 <a:solidFill>
                   <a:schemeClr val="accent1"/>
                 </a:solidFill>
               </a14:hiddenFill>
             </a:ext>
-            <a:ext uri="{91240B29-F687-4F45-9708-019B960494DF}">
+            <a:ext uri="{91240B29-F687-4f45-9708-019B960494DF}">
               <a14:hiddenLine xmlns:a14="http://schemas.microsoft.com/office/drawing/2010/main" w="9525">
                 <a:solidFill>
                   <a:schemeClr val="tx1"/>
@@ -5197,7 +5201,7 @@
                 <a:tailEnd/>
               </a14:hiddenLine>
             </a:ext>
-            <a:ext uri="{AF507438-7753-43E0-B8FC-AC1667EBCBE1}">
+            <a:ext uri="{AF507438-7753-43e0-B8FC-AC1667EBCBE1}">
               <a14:hiddenEffects xmlns:a14="http://schemas.microsoft.com/office/drawing/2010/main">
                 <a:effectLst>
                   <a:outerShdw dist="35921" dir="2700000" algn="ctr" rotWithShape="0">
@@ -5222,7 +5226,7 @@
   <p:timing>
     <p:tnLst>
       <p:par>
-        <p:cTn id="1" dur="indefinite" restart="never" nodeType="tmRoot"/>
+        <p:cTn xmlns:p14="http://schemas.microsoft.com/office/powerpoint/2010/main" id="1" dur="indefinite" restart="never" nodeType="tmRoot"/>
       </p:par>
     </p:tnLst>
   </p:timing>
@@ -5368,14 +5372,14 @@
           </a:ln>
           <a:effectLst/>
           <a:extLst>
-            <a:ext uri="{909E8E84-426E-40DD-AFC4-6F175D3DCCD1}">
+            <a:ext uri="{909E8E84-426E-40dd-AFC4-6F175D3DCCD1}">
               <a14:hiddenFill xmlns:a14="http://schemas.microsoft.com/office/drawing/2010/main">
                 <a:solidFill>
                   <a:schemeClr val="accent1"/>
                 </a:solidFill>
               </a14:hiddenFill>
             </a:ext>
-            <a:ext uri="{91240B29-F687-4F45-9708-019B960494DF}">
+            <a:ext uri="{91240B29-F687-4f45-9708-019B960494DF}">
               <a14:hiddenLine xmlns:a14="http://schemas.microsoft.com/office/drawing/2010/main" w="9525">
                 <a:solidFill>
                   <a:schemeClr val="tx1"/>
@@ -5385,7 +5389,7 @@
                 <a:tailEnd/>
               </a14:hiddenLine>
             </a:ext>
-            <a:ext uri="{AF507438-7753-43E0-B8FC-AC1667EBCBE1}">
+            <a:ext uri="{AF507438-7753-43e0-B8FC-AC1667EBCBE1}">
               <a14:hiddenEffects xmlns:a14="http://schemas.microsoft.com/office/drawing/2010/main">
                 <a:effectLst>
                   <a:outerShdw dist="35921" dir="2700000" algn="ctr" rotWithShape="0">
@@ -5410,7 +5414,7 @@
   <p:timing>
     <p:tnLst>
       <p:par>
-        <p:cTn id="1" dur="indefinite" restart="never" nodeType="tmRoot"/>
+        <p:cTn xmlns:p14="http://schemas.microsoft.com/office/powerpoint/2010/main" id="1" dur="indefinite" restart="never" nodeType="tmRoot"/>
       </p:par>
     </p:tnLst>
   </p:timing>
@@ -5644,14 +5648,14 @@
           </a:ln>
           <a:effectLst/>
           <a:extLst>
-            <a:ext uri="{909E8E84-426E-40DD-AFC4-6F175D3DCCD1}">
+            <a:ext uri="{909E8E84-426E-40dd-AFC4-6F175D3DCCD1}">
               <a14:hiddenFill xmlns:a14="http://schemas.microsoft.com/office/drawing/2010/main">
                 <a:solidFill>
                   <a:schemeClr val="accent1"/>
                 </a:solidFill>
               </a14:hiddenFill>
             </a:ext>
-            <a:ext uri="{91240B29-F687-4F45-9708-019B960494DF}">
+            <a:ext uri="{91240B29-F687-4f45-9708-019B960494DF}">
               <a14:hiddenLine xmlns:a14="http://schemas.microsoft.com/office/drawing/2010/main" w="9525">
                 <a:solidFill>
                   <a:schemeClr val="tx1"/>
@@ -5661,7 +5665,7 @@
                 <a:tailEnd/>
               </a14:hiddenLine>
             </a:ext>
-            <a:ext uri="{AF507438-7753-43E0-B8FC-AC1667EBCBE1}">
+            <a:ext uri="{AF507438-7753-43e0-B8FC-AC1667EBCBE1}">
               <a14:hiddenEffects xmlns:a14="http://schemas.microsoft.com/office/drawing/2010/main">
                 <a:effectLst>
                   <a:outerShdw dist="35921" dir="2700000" algn="ctr" rotWithShape="0">
@@ -5686,7 +5690,7 @@
   <p:timing>
     <p:tnLst>
       <p:par>
-        <p:cTn id="1" dur="indefinite" restart="never" nodeType="tmRoot"/>
+        <p:cTn xmlns:p14="http://schemas.microsoft.com/office/powerpoint/2010/main" id="1" dur="indefinite" restart="never" nodeType="tmRoot"/>
       </p:par>
     </p:tnLst>
   </p:timing>
@@ -5820,14 +5824,14 @@
           </a:ln>
           <a:effectLst/>
           <a:extLst>
-            <a:ext uri="{909E8E84-426E-40DD-AFC4-6F175D3DCCD1}">
+            <a:ext uri="{909E8E84-426E-40dd-AFC4-6F175D3DCCD1}">
               <a14:hiddenFill xmlns:a14="http://schemas.microsoft.com/office/drawing/2010/main">
                 <a:solidFill>
                   <a:schemeClr val="accent1"/>
                 </a:solidFill>
               </a14:hiddenFill>
             </a:ext>
-            <a:ext uri="{91240B29-F687-4F45-9708-019B960494DF}">
+            <a:ext uri="{91240B29-F687-4f45-9708-019B960494DF}">
               <a14:hiddenLine xmlns:a14="http://schemas.microsoft.com/office/drawing/2010/main" w="9525">
                 <a:solidFill>
                   <a:schemeClr val="tx1"/>
@@ -5837,7 +5841,7 @@
                 <a:tailEnd/>
               </a14:hiddenLine>
             </a:ext>
-            <a:ext uri="{AF507438-7753-43E0-B8FC-AC1667EBCBE1}">
+            <a:ext uri="{AF507438-7753-43e0-B8FC-AC1667EBCBE1}">
               <a14:hiddenEffects xmlns:a14="http://schemas.microsoft.com/office/drawing/2010/main">
                 <a:effectLst>
                   <a:outerShdw dist="35921" dir="2700000" algn="ctr" rotWithShape="0">
@@ -5862,7 +5866,7 @@
   <p:timing>
     <p:tnLst>
       <p:par>
-        <p:cTn id="1" dur="indefinite" restart="never" nodeType="tmRoot"/>
+        <p:cTn xmlns:p14="http://schemas.microsoft.com/office/powerpoint/2010/main" id="1" dur="indefinite" restart="never" nodeType="tmRoot"/>
       </p:par>
     </p:tnLst>
   </p:timing>

</xml_diff>